<commit_message>
Update: fit for pulse position at focus and manually shift to center.
</commit_message>
<xml_diff>
--- a/02-16-21_Sampling_Questions.pptx
+++ b/02-16-21_Sampling_Questions.pptx
@@ -234,7 +234,7 @@
           <a:p>
             <a:fld id="{5C8CEEAE-C5CB-4287-A49B-83B7925E3B42}" type="datetimeFigureOut">
               <a:rPr lang="zh-CN" altLang="en-US" smtClean="0"/>
-              <a:t>2021/2/16</a:t>
+              <a:t>2021/2/17</a:t>
             </a:fld>
             <a:endParaRPr lang="zh-CN" altLang="en-US"/>
           </a:p>
@@ -1152,7 +1152,7 @@
           <a:p>
             <a:fld id="{CBBDB556-1BF6-40A7-A227-6CBCA41D0D0E}" type="datetimeFigureOut">
               <a:rPr lang="zh-CN" altLang="en-US" smtClean="0"/>
-              <a:t>2021/2/16</a:t>
+              <a:t>2021/2/17</a:t>
             </a:fld>
             <a:endParaRPr lang="zh-CN" altLang="en-US"/>
           </a:p>
@@ -1350,7 +1350,7 @@
           <a:p>
             <a:fld id="{CBBDB556-1BF6-40A7-A227-6CBCA41D0D0E}" type="datetimeFigureOut">
               <a:rPr lang="zh-CN" altLang="en-US" smtClean="0"/>
-              <a:t>2021/2/16</a:t>
+              <a:t>2021/2/17</a:t>
             </a:fld>
             <a:endParaRPr lang="zh-CN" altLang="en-US"/>
           </a:p>
@@ -1558,7 +1558,7 @@
           <a:p>
             <a:fld id="{CBBDB556-1BF6-40A7-A227-6CBCA41D0D0E}" type="datetimeFigureOut">
               <a:rPr lang="zh-CN" altLang="en-US" smtClean="0"/>
-              <a:t>2021/2/16</a:t>
+              <a:t>2021/2/17</a:t>
             </a:fld>
             <a:endParaRPr lang="zh-CN" altLang="en-US"/>
           </a:p>
@@ -1756,7 +1756,7 @@
           <a:p>
             <a:fld id="{CBBDB556-1BF6-40A7-A227-6CBCA41D0D0E}" type="datetimeFigureOut">
               <a:rPr lang="zh-CN" altLang="en-US" smtClean="0"/>
-              <a:t>2021/2/16</a:t>
+              <a:t>2021/2/17</a:t>
             </a:fld>
             <a:endParaRPr lang="zh-CN" altLang="en-US"/>
           </a:p>
@@ -2031,7 +2031,7 @@
           <a:p>
             <a:fld id="{CBBDB556-1BF6-40A7-A227-6CBCA41D0D0E}" type="datetimeFigureOut">
               <a:rPr lang="zh-CN" altLang="en-US" smtClean="0"/>
-              <a:t>2021/2/16</a:t>
+              <a:t>2021/2/17</a:t>
             </a:fld>
             <a:endParaRPr lang="zh-CN" altLang="en-US"/>
           </a:p>
@@ -2296,7 +2296,7 @@
           <a:p>
             <a:fld id="{CBBDB556-1BF6-40A7-A227-6CBCA41D0D0E}" type="datetimeFigureOut">
               <a:rPr lang="zh-CN" altLang="en-US" smtClean="0"/>
-              <a:t>2021/2/16</a:t>
+              <a:t>2021/2/17</a:t>
             </a:fld>
             <a:endParaRPr lang="zh-CN" altLang="en-US"/>
           </a:p>
@@ -2708,7 +2708,7 @@
           <a:p>
             <a:fld id="{CBBDB556-1BF6-40A7-A227-6CBCA41D0D0E}" type="datetimeFigureOut">
               <a:rPr lang="zh-CN" altLang="en-US" smtClean="0"/>
-              <a:t>2021/2/16</a:t>
+              <a:t>2021/2/17</a:t>
             </a:fld>
             <a:endParaRPr lang="zh-CN" altLang="en-US"/>
           </a:p>
@@ -2849,7 +2849,7 @@
           <a:p>
             <a:fld id="{CBBDB556-1BF6-40A7-A227-6CBCA41D0D0E}" type="datetimeFigureOut">
               <a:rPr lang="zh-CN" altLang="en-US" smtClean="0"/>
-              <a:t>2021/2/16</a:t>
+              <a:t>2021/2/17</a:t>
             </a:fld>
             <a:endParaRPr lang="zh-CN" altLang="en-US"/>
           </a:p>
@@ -2962,7 +2962,7 @@
           <a:p>
             <a:fld id="{CBBDB556-1BF6-40A7-A227-6CBCA41D0D0E}" type="datetimeFigureOut">
               <a:rPr lang="zh-CN" altLang="en-US" smtClean="0"/>
-              <a:t>2021/2/16</a:t>
+              <a:t>2021/2/17</a:t>
             </a:fld>
             <a:endParaRPr lang="zh-CN" altLang="en-US"/>
           </a:p>
@@ -3273,7 +3273,7 @@
           <a:p>
             <a:fld id="{CBBDB556-1BF6-40A7-A227-6CBCA41D0D0E}" type="datetimeFigureOut">
               <a:rPr lang="zh-CN" altLang="en-US" smtClean="0"/>
-              <a:t>2021/2/16</a:t>
+              <a:t>2021/2/17</a:t>
             </a:fld>
             <a:endParaRPr lang="zh-CN" altLang="en-US"/>
           </a:p>
@@ -3561,7 +3561,7 @@
           <a:p>
             <a:fld id="{CBBDB556-1BF6-40A7-A227-6CBCA41D0D0E}" type="datetimeFigureOut">
               <a:rPr lang="zh-CN" altLang="en-US" smtClean="0"/>
-              <a:t>2021/2/16</a:t>
+              <a:t>2021/2/17</a:t>
             </a:fld>
             <a:endParaRPr lang="zh-CN" altLang="en-US"/>
           </a:p>
@@ -3802,7 +3802,7 @@
           <a:p>
             <a:fld id="{CBBDB556-1BF6-40A7-A227-6CBCA41D0D0E}" type="datetimeFigureOut">
               <a:rPr lang="zh-CN" altLang="en-US" smtClean="0"/>
-              <a:t>2021/2/16</a:t>
+              <a:t>2021/2/17</a:t>
             </a:fld>
             <a:endParaRPr lang="zh-CN" altLang="en-US"/>
           </a:p>
@@ -6077,7 +6077,7 @@
         <p:spPr>
           <a:xfrm>
             <a:off x="1246378" y="4014521"/>
-            <a:ext cx="9174369" cy="2308324"/>
+            <a:ext cx="9174369" cy="2585323"/>
           </a:xfrm>
           <a:prstGeom prst="rect">
             <a:avLst/>
@@ -6130,8 +6130,17 @@
             </a:r>
             <a:r>
               <a:rPr lang="en-US" altLang="zh-CN" dirty="0"/>
-              <a:t>])?</a:t>
-            </a:r>
+              <a:t>])? </a:t>
+            </a:r>
+            <a:r>
+              <a:rPr lang="en-US" altLang="zh-CN" dirty="0">
+                <a:solidFill>
+                  <a:srgbClr val="FF0000"/>
+                </a:solidFill>
+              </a:rPr>
+              <a:t>This is a bug in my code when extracting 3D pulse intensity. Fixed after enforcing the extraction in the right domain.</a:t>
+            </a:r>
+            <a:endParaRPr lang="en-US" altLang="zh-CN" dirty="0"/>
           </a:p>
           <a:p>
             <a:r>

</xml_diff>